<commit_message>
minor edit to pp
</commit_message>
<xml_diff>
--- a/Powerpoint/Covid-19 Vaccination Dashboard (1).pptx
+++ b/Powerpoint/Covid-19 Vaccination Dashboard (1).pptx
@@ -5143,7 +5143,7 @@
             </a:r>
             <a:r>
               <a:rPr lang="en-US" sz="1800" b="1" dirty="0"/>
-              <a:t>Not really</a:t>
+              <a:t>Effective</a:t>
             </a:r>
           </a:p>
         </p:txBody>
@@ -5200,9 +5200,10 @@
               <a:t>Is the vaccine effective in the US? = </a:t>
             </a:r>
             <a:r>
-              <a:rPr lang="en-US" sz="1800" b="1" dirty="0"/>
-              <a:t>Yes</a:t>
-            </a:r>
+              <a:rPr lang="en-US" sz="1800" b="1"/>
+              <a:t>Very Effective</a:t>
+            </a:r>
+            <a:endParaRPr lang="en-US" sz="1800" b="1" dirty="0"/>
           </a:p>
         </p:txBody>
       </p:sp>

</xml_diff>

<commit_message>
another minor edit to pp
</commit_message>
<xml_diff>
--- a/Powerpoint/Covid-19 Vaccination Dashboard (1).pptx
+++ b/Powerpoint/Covid-19 Vaccination Dashboard (1).pptx
@@ -5143,7 +5143,7 @@
             </a:r>
             <a:r>
               <a:rPr lang="en-US" sz="1800" b="1" dirty="0"/>
-              <a:t>Effective</a:t>
+              <a:t>EFFECTIVE</a:t>
             </a:r>
           </a:p>
         </p:txBody>
@@ -5200,10 +5200,17 @@
               <a:t>Is the vaccine effective in the US? = </a:t>
             </a:r>
             <a:r>
-              <a:rPr lang="en-US" sz="1800" b="1"/>
-              <a:t>Very Effective</a:t>
-            </a:r>
-            <a:endParaRPr lang="en-US" sz="1800" b="1" dirty="0"/>
+              <a:rPr lang="en-US" sz="1800" b="1" dirty="0"/>
+              <a:t>VERY</a:t>
+            </a:r>
+            <a:r>
+              <a:rPr lang="en-US" sz="1800" dirty="0"/>
+              <a:t> </a:t>
+            </a:r>
+            <a:r>
+              <a:rPr lang="en-US" sz="1800" b="1" dirty="0"/>
+              <a:t>EFFECTIVE</a:t>
+            </a:r>
           </a:p>
         </p:txBody>
       </p:sp>

</xml_diff>